<commit_message>
added midas imputation and updated part of timelog
</commit_message>
<xml_diff>
--- a/meetings/week 14 Meeting.pptx
+++ b/meetings/week 14 Meeting.pptx
@@ -10,8 +10,8 @@
     <p:sldId id="258" r:id="rId4"/>
     <p:sldId id="260" r:id="rId5"/>
     <p:sldId id="261" r:id="rId6"/>
-    <p:sldId id="263" r:id="rId7"/>
-    <p:sldId id="265" r:id="rId8"/>
+    <p:sldId id="268" r:id="rId7"/>
+    <p:sldId id="263" r:id="rId8"/>
     <p:sldId id="266" r:id="rId9"/>
     <p:sldId id="267" r:id="rId10"/>
     <p:sldId id="262" r:id="rId11"/>
@@ -124,7 +124,7 @@
 <file path=ppt/revisionInfo.xml><?xml version="1.0" encoding="utf-8"?>
 <p1510:revInfo xmlns:a="http://schemas.openxmlformats.org/drawingml/2006/main" xmlns:r="http://schemas.openxmlformats.org/officeDocument/2006/relationships" xmlns:p1510="http://schemas.microsoft.com/office/powerpoint/2015/10/main">
   <p1510:revLst>
-    <p1510:client id="{A8EA4541-91CE-4694-BA03-14DDF92B2167}" v="7" dt="2022-01-24T04:24:26.260"/>
+    <p1510:client id="{A8EA4541-91CE-4694-BA03-14DDF92B2167}" v="11" dt="2022-01-24T11:22:50.326"/>
   </p1510:revLst>
 </p1510:revInfo>
 </file>
@@ -134,7 +134,7 @@
   <pc:docChgLst>
     <pc:chgData name="toby lee" userId="c2b0b406bfa6151f" providerId="LiveId" clId="{A8EA4541-91CE-4694-BA03-14DDF92B2167}"/>
     <pc:docChg chg="undo custSel addSld delSld modSld">
-      <pc:chgData name="toby lee" userId="c2b0b406bfa6151f" providerId="LiveId" clId="{A8EA4541-91CE-4694-BA03-14DDF92B2167}" dt="2022-01-24T04:24:49.069" v="1649" actId="20577"/>
+      <pc:chgData name="toby lee" userId="c2b0b406bfa6151f" providerId="LiveId" clId="{A8EA4541-91CE-4694-BA03-14DDF92B2167}" dt="2022-01-24T11:58:41.651" v="1770" actId="20577"/>
       <pc:docMkLst>
         <pc:docMk/>
       </pc:docMkLst>
@@ -613,8 +613,8 @@
           <pc:sldMk cId="1164727395" sldId="264"/>
         </pc:sldMkLst>
       </pc:sldChg>
-      <pc:sldChg chg="modSp add mod">
-        <pc:chgData name="toby lee" userId="c2b0b406bfa6151f" providerId="LiveId" clId="{A8EA4541-91CE-4694-BA03-14DDF92B2167}" dt="2022-01-24T04:24:34.217" v="1616" actId="20577"/>
+      <pc:sldChg chg="modSp add del mod">
+        <pc:chgData name="toby lee" userId="c2b0b406bfa6151f" providerId="LiveId" clId="{A8EA4541-91CE-4694-BA03-14DDF92B2167}" dt="2022-01-24T11:25:48.471" v="1707" actId="47"/>
         <pc:sldMkLst>
           <pc:docMk/>
           <pc:sldMk cId="2501847746" sldId="265"/>
@@ -628,8 +628,8 @@
           </ac:spMkLst>
         </pc:spChg>
       </pc:sldChg>
-      <pc:sldChg chg="modSp new mod">
-        <pc:chgData name="toby lee" userId="c2b0b406bfa6151f" providerId="LiveId" clId="{A8EA4541-91CE-4694-BA03-14DDF92B2167}" dt="2022-01-24T04:24:43.551" v="1636" actId="20577"/>
+      <pc:sldChg chg="addSp delSp modSp new mod">
+        <pc:chgData name="toby lee" userId="c2b0b406bfa6151f" providerId="LiveId" clId="{A8EA4541-91CE-4694-BA03-14DDF92B2167}" dt="2022-01-24T11:41:46.277" v="1714" actId="1076"/>
         <pc:sldMkLst>
           <pc:docMk/>
           <pc:sldMk cId="563442722" sldId="266"/>
@@ -642,9 +642,81 @@
             <ac:spMk id="2" creationId="{F2A75966-0EEF-4B05-84CD-1340760C6FD0}"/>
           </ac:spMkLst>
         </pc:spChg>
+        <pc:spChg chg="del">
+          <ac:chgData name="toby lee" userId="c2b0b406bfa6151f" providerId="LiveId" clId="{A8EA4541-91CE-4694-BA03-14DDF92B2167}" dt="2022-01-24T11:21:18.755" v="1654" actId="478"/>
+          <ac:spMkLst>
+            <pc:docMk/>
+            <pc:sldMk cId="563442722" sldId="266"/>
+            <ac:spMk id="3" creationId="{5D4A82EE-1500-4847-9402-018FB2C2AC78}"/>
+          </ac:spMkLst>
+        </pc:spChg>
+        <pc:spChg chg="add mod">
+          <ac:chgData name="toby lee" userId="c2b0b406bfa6151f" providerId="LiveId" clId="{A8EA4541-91CE-4694-BA03-14DDF92B2167}" dt="2022-01-24T11:21:25.964" v="1667" actId="20577"/>
+          <ac:spMkLst>
+            <pc:docMk/>
+            <pc:sldMk cId="563442722" sldId="266"/>
+            <ac:spMk id="6" creationId="{F66BC9D0-8204-482F-A6AE-A9FCC5435173}"/>
+          </ac:spMkLst>
+        </pc:spChg>
+        <pc:spChg chg="add mod">
+          <ac:chgData name="toby lee" userId="c2b0b406bfa6151f" providerId="LiveId" clId="{A8EA4541-91CE-4694-BA03-14DDF92B2167}" dt="2022-01-24T11:23:01.573" v="1699" actId="20577"/>
+          <ac:spMkLst>
+            <pc:docMk/>
+            <pc:sldMk cId="563442722" sldId="266"/>
+            <ac:spMk id="13" creationId="{87C2DFF7-B986-4C19-851F-99BAE8685C6D}"/>
+          </ac:spMkLst>
+        </pc:spChg>
+        <pc:spChg chg="add mod">
+          <ac:chgData name="toby lee" userId="c2b0b406bfa6151f" providerId="LiveId" clId="{A8EA4541-91CE-4694-BA03-14DDF92B2167}" dt="2022-01-24T11:23:03.685" v="1702" actId="20577"/>
+          <ac:spMkLst>
+            <pc:docMk/>
+            <pc:sldMk cId="563442722" sldId="266"/>
+            <ac:spMk id="14" creationId="{3F23ABA7-35F1-4172-BC31-B337BF7F8104}"/>
+          </ac:spMkLst>
+        </pc:spChg>
+        <pc:spChg chg="add mod">
+          <ac:chgData name="toby lee" userId="c2b0b406bfa6151f" providerId="LiveId" clId="{A8EA4541-91CE-4694-BA03-14DDF92B2167}" dt="2022-01-24T11:23:17.675" v="1706" actId="20577"/>
+          <ac:spMkLst>
+            <pc:docMk/>
+            <pc:sldMk cId="563442722" sldId="266"/>
+            <ac:spMk id="15" creationId="{B64141CF-BD9D-44CE-90D8-F85928E1732B}"/>
+          </ac:spMkLst>
+        </pc:spChg>
+        <pc:picChg chg="add mod">
+          <ac:chgData name="toby lee" userId="c2b0b406bfa6151f" providerId="LiveId" clId="{A8EA4541-91CE-4694-BA03-14DDF92B2167}" dt="2022-01-24T11:22:30.863" v="1679" actId="1076"/>
+          <ac:picMkLst>
+            <pc:docMk/>
+            <pc:sldMk cId="563442722" sldId="266"/>
+            <ac:picMk id="5" creationId="{1B035DA2-E9E0-4F99-86BF-BFF530AC1228}"/>
+          </ac:picMkLst>
+        </pc:picChg>
+        <pc:picChg chg="add mod">
+          <ac:chgData name="toby lee" userId="c2b0b406bfa6151f" providerId="LiveId" clId="{A8EA4541-91CE-4694-BA03-14DDF92B2167}" dt="2022-01-24T11:41:46.277" v="1714" actId="1076"/>
+          <ac:picMkLst>
+            <pc:docMk/>
+            <pc:sldMk cId="563442722" sldId="266"/>
+            <ac:picMk id="8" creationId="{2DC0B4F7-660A-4786-A1F9-7A8AD0990A84}"/>
+          </ac:picMkLst>
+        </pc:picChg>
+        <pc:picChg chg="add mod">
+          <ac:chgData name="toby lee" userId="c2b0b406bfa6151f" providerId="LiveId" clId="{A8EA4541-91CE-4694-BA03-14DDF92B2167}" dt="2022-01-24T11:22:32.473" v="1680" actId="1076"/>
+          <ac:picMkLst>
+            <pc:docMk/>
+            <pc:sldMk cId="563442722" sldId="266"/>
+            <ac:picMk id="10" creationId="{A17ACADC-BE7B-470E-9652-A3041ED04316}"/>
+          </ac:picMkLst>
+        </pc:picChg>
+        <pc:picChg chg="add mod">
+          <ac:chgData name="toby lee" userId="c2b0b406bfa6151f" providerId="LiveId" clId="{A8EA4541-91CE-4694-BA03-14DDF92B2167}" dt="2022-01-24T11:22:47.636" v="1684" actId="1076"/>
+          <ac:picMkLst>
+            <pc:docMk/>
+            <pc:sldMk cId="563442722" sldId="266"/>
+            <ac:picMk id="12" creationId="{7F464FE0-5E10-4476-9D17-35CF4D66D257}"/>
+          </ac:picMkLst>
+        </pc:picChg>
       </pc:sldChg>
       <pc:sldChg chg="modSp new mod">
-        <pc:chgData name="toby lee" userId="c2b0b406bfa6151f" providerId="LiveId" clId="{A8EA4541-91CE-4694-BA03-14DDF92B2167}" dt="2022-01-24T04:24:49.069" v="1649" actId="20577"/>
+        <pc:chgData name="toby lee" userId="c2b0b406bfa6151f" providerId="LiveId" clId="{A8EA4541-91CE-4694-BA03-14DDF92B2167}" dt="2022-01-24T11:58:41.651" v="1770" actId="20577"/>
         <pc:sldMkLst>
           <pc:docMk/>
           <pc:sldMk cId="1813198703" sldId="267"/>
@@ -657,6 +729,29 @@
             <ac:spMk id="2" creationId="{FDF10F4E-0CA5-4FD5-B44E-8F50FC51E611}"/>
           </ac:spMkLst>
         </pc:spChg>
+        <pc:spChg chg="mod">
+          <ac:chgData name="toby lee" userId="c2b0b406bfa6151f" providerId="LiveId" clId="{A8EA4541-91CE-4694-BA03-14DDF92B2167}" dt="2022-01-24T11:58:41.651" v="1770" actId="20577"/>
+          <ac:spMkLst>
+            <pc:docMk/>
+            <pc:sldMk cId="1813198703" sldId="267"/>
+            <ac:spMk id="3" creationId="{D823B0E7-A756-4AFD-840A-5083B7E0857C}"/>
+          </ac:spMkLst>
+        </pc:spChg>
+      </pc:sldChg>
+      <pc:sldChg chg="addSp modSp new mod">
+        <pc:chgData name="toby lee" userId="c2b0b406bfa6151f" providerId="LiveId" clId="{A8EA4541-91CE-4694-BA03-14DDF92B2167}" dt="2022-01-24T11:30:26.850" v="1713" actId="1076"/>
+        <pc:sldMkLst>
+          <pc:docMk/>
+          <pc:sldMk cId="3020113664" sldId="268"/>
+        </pc:sldMkLst>
+        <pc:picChg chg="add mod">
+          <ac:chgData name="toby lee" userId="c2b0b406bfa6151f" providerId="LiveId" clId="{A8EA4541-91CE-4694-BA03-14DDF92B2167}" dt="2022-01-24T11:30:26.850" v="1713" actId="1076"/>
+          <ac:picMkLst>
+            <pc:docMk/>
+            <pc:sldMk cId="3020113664" sldId="268"/>
+            <ac:picMk id="5" creationId="{30A54B2C-E2C4-4340-8657-80A4CAF9A226}"/>
+          </ac:picMkLst>
+        </pc:picChg>
       </pc:sldChg>
     </pc:docChg>
   </pc:docChgLst>
@@ -988,7 +1083,7 @@
           <a:p>
             <a:fld id="{ED291B17-9318-49DB-B28B-6E5994AE9581}" type="datetime1">
               <a:rPr lang="en-US" smtClean="0"/>
-              <a:t>1/23/2022</a:t>
+              <a:t>1/24/2022</a:t>
             </a:fld>
             <a:endParaRPr lang="en-US" dirty="0"/>
           </a:p>
@@ -1191,7 +1286,7 @@
           <a:p>
             <a:fld id="{2CED4963-E985-44C4-B8C4-FDD613B7C2F8}" type="datetime1">
               <a:rPr lang="en-US" smtClean="0"/>
-              <a:t>1/23/2022</a:t>
+              <a:t>1/24/2022</a:t>
             </a:fld>
             <a:endParaRPr lang="en-US" dirty="0"/>
           </a:p>
@@ -1553,7 +1648,7 @@
           <a:p>
             <a:fld id="{ED291B17-9318-49DB-B28B-6E5994AE9581}" type="datetime1">
               <a:rPr lang="en-US" smtClean="0"/>
-              <a:t>1/23/2022</a:t>
+              <a:t>1/24/2022</a:t>
             </a:fld>
             <a:endParaRPr lang="en-US" dirty="0"/>
           </a:p>
@@ -1751,7 +1846,7 @@
           <a:p>
             <a:fld id="{78DD82B9-B8EE-4375-B6FF-88FA6ABB15D9}" type="datetime1">
               <a:rPr lang="en-US" smtClean="0"/>
-              <a:t>1/23/2022</a:t>
+              <a:t>1/24/2022</a:t>
             </a:fld>
             <a:endParaRPr lang="en-US" dirty="0"/>
           </a:p>
@@ -2063,7 +2158,7 @@
           <a:p>
             <a:fld id="{B2497495-0637-405E-AE64-5CC7506D51F5}" type="datetime1">
               <a:rPr lang="en-US" smtClean="0"/>
-              <a:t>1/23/2022</a:t>
+              <a:t>1/24/2022</a:t>
             </a:fld>
             <a:endParaRPr lang="en-US" dirty="0"/>
           </a:p>
@@ -2316,7 +2411,7 @@
           <a:p>
             <a:fld id="{7BFFD690-9426-415D-8B65-26881E07B2D4}" type="datetime1">
               <a:rPr lang="en-US" smtClean="0"/>
-              <a:t>1/23/2022</a:t>
+              <a:t>1/24/2022</a:t>
             </a:fld>
             <a:endParaRPr lang="en-US" dirty="0"/>
           </a:p>
@@ -2738,7 +2833,7 @@
           <a:p>
             <a:fld id="{04C4989A-474C-40DE-95B9-011C28B71673}" type="datetime1">
               <a:rPr lang="en-US" smtClean="0"/>
-              <a:t>1/23/2022</a:t>
+              <a:t>1/24/2022</a:t>
             </a:fld>
             <a:endParaRPr lang="en-US" dirty="0"/>
           </a:p>
@@ -2861,7 +2956,7 @@
           <a:p>
             <a:fld id="{5DB4ED54-5B5E-4A04-93D3-5772E3CE3818}" type="datetime1">
               <a:rPr lang="en-US" smtClean="0"/>
-              <a:t>1/23/2022</a:t>
+              <a:t>1/24/2022</a:t>
             </a:fld>
             <a:endParaRPr lang="en-US" dirty="0"/>
           </a:p>
@@ -2956,7 +3051,7 @@
           <a:p>
             <a:fld id="{4EDE50D6-574B-40AF-946F-D52A04ADE379}" type="datetime1">
               <a:rPr lang="en-US" smtClean="0"/>
-              <a:t>1/23/2022</a:t>
+              <a:t>1/24/2022</a:t>
             </a:fld>
             <a:endParaRPr lang="en-US" dirty="0"/>
           </a:p>
@@ -3333,7 +3428,7 @@
           <a:p>
             <a:fld id="{D82884F1-FFEA-405F-9602-3DCA865EDA4E}" type="datetime1">
               <a:rPr lang="en-US" smtClean="0"/>
-              <a:t>1/23/2022</a:t>
+              <a:t>1/24/2022</a:t>
             </a:fld>
             <a:endParaRPr lang="en-US" dirty="0"/>
           </a:p>
@@ -3626,7 +3721,7 @@
           <a:p>
             <a:fld id="{7E18DB4A-8810-4A10-AD5C-D5E2C667F5B3}" type="datetime1">
               <a:rPr lang="en-US" smtClean="0"/>
-              <a:t>1/23/2022</a:t>
+              <a:t>1/24/2022</a:t>
             </a:fld>
             <a:endParaRPr lang="en-US" dirty="0"/>
           </a:p>
@@ -3841,7 +3936,7 @@
           <a:p>
             <a:fld id="{ED291B17-9318-49DB-B28B-6E5994AE9581}" type="datetime1">
               <a:rPr lang="en-US" smtClean="0"/>
-              <a:t>1/23/2022</a:t>
+              <a:t>1/24/2022</a:t>
             </a:fld>
             <a:endParaRPr lang="en-US" dirty="0"/>
           </a:p>
@@ -5624,8 +5719,8 @@
           </a:p>
         </p:txBody>
       </p:sp>
-      <mc:AlternateContent xmlns:mc="http://schemas.openxmlformats.org/markup-compatibility/2006">
-        <mc:Choice xmlns:p14="http://schemas.microsoft.com/office/powerpoint/2010/main" Requires="p14">
+      <mc:AlternateContent xmlns:mc="http://schemas.openxmlformats.org/markup-compatibility/2006" xmlns:p14="http://schemas.microsoft.com/office/powerpoint/2010/main">
+        <mc:Choice Requires="p14">
           <p:contentPart p14:bwMode="auto" r:id="rId6">
             <p14:nvContentPartPr>
               <p14:cNvPr id="12" name="Ink 11">
@@ -5644,7 +5739,7 @@
             </p14:xfrm>
           </p:contentPart>
         </mc:Choice>
-        <mc:Fallback>
+        <mc:Fallback xmlns="">
           <p:pic>
             <p:nvPicPr>
               <p:cNvPr id="12" name="Ink 11">
@@ -5675,8 +5770,8 @@
           </p:pic>
         </mc:Fallback>
       </mc:AlternateContent>
-      <mc:AlternateContent xmlns:mc="http://schemas.openxmlformats.org/markup-compatibility/2006">
-        <mc:Choice xmlns:p14="http://schemas.microsoft.com/office/powerpoint/2010/main" Requires="p14">
+      <mc:AlternateContent xmlns:mc="http://schemas.openxmlformats.org/markup-compatibility/2006" xmlns:p14="http://schemas.microsoft.com/office/powerpoint/2010/main">
+        <mc:Choice Requires="p14">
           <p:contentPart p14:bwMode="auto" r:id="rId8">
             <p14:nvContentPartPr>
               <p14:cNvPr id="13" name="Ink 12">
@@ -5695,7 +5790,7 @@
             </p14:xfrm>
           </p:contentPart>
         </mc:Choice>
-        <mc:Fallback>
+        <mc:Fallback xmlns="">
           <p:pic>
             <p:nvPicPr>
               <p:cNvPr id="13" name="Ink 12">
@@ -5726,8 +5821,8 @@
           </p:pic>
         </mc:Fallback>
       </mc:AlternateContent>
-      <mc:AlternateContent xmlns:mc="http://schemas.openxmlformats.org/markup-compatibility/2006">
-        <mc:Choice xmlns:p14="http://schemas.microsoft.com/office/powerpoint/2010/main" Requires="p14">
+      <mc:AlternateContent xmlns:mc="http://schemas.openxmlformats.org/markup-compatibility/2006" xmlns:p14="http://schemas.microsoft.com/office/powerpoint/2010/main">
+        <mc:Choice Requires="p14">
           <p:contentPart p14:bwMode="auto" r:id="rId10">
             <p14:nvContentPartPr>
               <p14:cNvPr id="14" name="Ink 13">
@@ -5746,7 +5841,7 @@
             </p14:xfrm>
           </p:contentPart>
         </mc:Choice>
-        <mc:Fallback>
+        <mc:Fallback xmlns="">
           <p:pic>
             <p:nvPicPr>
               <p:cNvPr id="14" name="Ink 13">
@@ -6086,7 +6181,7 @@
           <p:cNvPr id="2" name="Title 1">
             <a:extLst>
               <a:ext uri="{FF2B5EF4-FFF2-40B4-BE49-F238E27FC236}">
-                <a16:creationId xmlns:a16="http://schemas.microsoft.com/office/drawing/2014/main" id="{16B03E48-FA15-4546-8005-9AA9DACA1F66}"/>
+                <a16:creationId xmlns:a16="http://schemas.microsoft.com/office/drawing/2014/main" id="{25B94364-5760-486F-BD13-87C1E4188DDD}"/>
               </a:ext>
             </a:extLst>
           </p:cNvPr>
@@ -6097,29 +6192,46 @@
             <p:ph type="title"/>
           </p:nvPr>
         </p:nvSpPr>
-        <p:spPr>
-          <a:xfrm>
-            <a:off x="581192" y="467025"/>
-            <a:ext cx="11029616" cy="1188720"/>
-          </a:xfrm>
-        </p:spPr>
+        <p:spPr/>
         <p:txBody>
           <a:bodyPr/>
           <a:lstStyle/>
           <a:p>
-            <a:r>
-              <a:rPr lang="en-GB" dirty="0"/>
-              <a:t>Performance comparison (Logistic Regression)</a:t>
-            </a:r>
+            <a:endParaRPr lang="en-GB"/>
+          </a:p>
+        </p:txBody>
+      </p:sp>
+      <p:sp>
+        <p:nvSpPr>
+          <p:cNvPr id="3" name="Content Placeholder 2">
+            <a:extLst>
+              <a:ext uri="{FF2B5EF4-FFF2-40B4-BE49-F238E27FC236}">
+                <a16:creationId xmlns:a16="http://schemas.microsoft.com/office/drawing/2014/main" id="{4D9011F8-D2A4-41E4-90BB-0E9B1020415A}"/>
+              </a:ext>
+            </a:extLst>
+          </p:cNvPr>
+          <p:cNvSpPr>
+            <a:spLocks noGrp="1"/>
+          </p:cNvSpPr>
+          <p:nvPr>
+            <p:ph idx="1"/>
+          </p:nvPr>
+        </p:nvSpPr>
+        <p:spPr/>
+        <p:txBody>
+          <a:bodyPr/>
+          <a:lstStyle/>
+          <a:p>
+            <a:endParaRPr lang="en-GB"/>
           </a:p>
         </p:txBody>
       </p:sp>
       <p:pic>
         <p:nvPicPr>
-          <p:cNvPr id="23" name="Picture 22">
+          <p:cNvPr id="5" name="Picture 4">
             <a:extLst>
               <a:ext uri="{FF2B5EF4-FFF2-40B4-BE49-F238E27FC236}">
-                <a16:creationId xmlns:a16="http://schemas.microsoft.com/office/drawing/2014/main" id="{0C0CF27D-698D-4353-8F9B-469F7EB047FA}"/>
+                <a16:creationId xmlns:a16="http://schemas.microsoft.com/office/drawing/2014/main" id="{30A54B2C-E2C4-4340-8657-80A4CAF9A226}"/>
               </a:ext>
             </a:extLst>
           </p:cNvPr>
@@ -6136,152 +6248,8 @@
         </p:blipFill>
         <p:spPr>
           <a:xfrm>
-            <a:off x="634502" y="2026055"/>
-            <a:ext cx="2018456" cy="4485458"/>
-          </a:xfrm>
-          <a:prstGeom prst="rect">
-            <a:avLst/>
-          </a:prstGeom>
-        </p:spPr>
-      </p:pic>
-      <p:pic>
-        <p:nvPicPr>
-          <p:cNvPr id="25" name="Picture 24" descr="Chart, treemap chart&#10;&#10;Description automatically generated">
-            <a:extLst>
-              <a:ext uri="{FF2B5EF4-FFF2-40B4-BE49-F238E27FC236}">
-                <a16:creationId xmlns:a16="http://schemas.microsoft.com/office/drawing/2014/main" id="{342BE2D9-9082-49F9-9052-4FC2EBCC553A}"/>
-              </a:ext>
-            </a:extLst>
-          </p:cNvPr>
-          <p:cNvPicPr>
-            <a:picLocks noChangeAspect="1"/>
-          </p:cNvPicPr>
-          <p:nvPr/>
-        </p:nvPicPr>
-        <p:blipFill>
-          <a:blip r:embed="rId3">
-            <a:extLst>
-              <a:ext uri="{28A0092B-C50C-407E-A947-70E740481C1C}">
-                <a14:useLocalDpi xmlns:a14="http://schemas.microsoft.com/office/drawing/2010/main" val="0"/>
-              </a:ext>
-            </a:extLst>
-          </a:blip>
-          <a:stretch>
-            <a:fillRect/>
-          </a:stretch>
-        </p:blipFill>
-        <p:spPr>
-          <a:xfrm>
-            <a:off x="3395457" y="1736304"/>
-            <a:ext cx="2635229" cy="2520000"/>
-          </a:xfrm>
-          <a:prstGeom prst="rect">
-            <a:avLst/>
-          </a:prstGeom>
-        </p:spPr>
-      </p:pic>
-      <p:pic>
-        <p:nvPicPr>
-          <p:cNvPr id="27" name="Picture 26" descr="Chart, treemap chart&#10;&#10;Description automatically generated">
-            <a:extLst>
-              <a:ext uri="{FF2B5EF4-FFF2-40B4-BE49-F238E27FC236}">
-                <a16:creationId xmlns:a16="http://schemas.microsoft.com/office/drawing/2014/main" id="{2C60723F-5B1B-42CD-8633-C29D0BA10772}"/>
-              </a:ext>
-            </a:extLst>
-          </p:cNvPr>
-          <p:cNvPicPr>
-            <a:picLocks noChangeAspect="1"/>
-          </p:cNvPicPr>
-          <p:nvPr/>
-        </p:nvPicPr>
-        <p:blipFill>
-          <a:blip r:embed="rId4">
-            <a:extLst>
-              <a:ext uri="{28A0092B-C50C-407E-A947-70E740481C1C}">
-                <a14:useLocalDpi xmlns:a14="http://schemas.microsoft.com/office/drawing/2010/main" val="0"/>
-              </a:ext>
-            </a:extLst>
-          </a:blip>
-          <a:stretch>
-            <a:fillRect/>
-          </a:stretch>
-        </p:blipFill>
-        <p:spPr>
-          <a:xfrm>
-            <a:off x="3395457" y="4256304"/>
-            <a:ext cx="2635229" cy="2520000"/>
-          </a:xfrm>
-          <a:prstGeom prst="rect">
-            <a:avLst/>
-          </a:prstGeom>
-        </p:spPr>
-      </p:pic>
-      <p:pic>
-        <p:nvPicPr>
-          <p:cNvPr id="29" name="Picture 28" descr="Treemap chart&#10;&#10;Description automatically generated with medium confidence">
-            <a:extLst>
-              <a:ext uri="{FF2B5EF4-FFF2-40B4-BE49-F238E27FC236}">
-                <a16:creationId xmlns:a16="http://schemas.microsoft.com/office/drawing/2014/main" id="{0A37471A-14A5-4A5E-B9CE-1288D4DA07E5}"/>
-              </a:ext>
-            </a:extLst>
-          </p:cNvPr>
-          <p:cNvPicPr>
-            <a:picLocks noChangeAspect="1"/>
-          </p:cNvPicPr>
-          <p:nvPr/>
-        </p:nvPicPr>
-        <p:blipFill>
-          <a:blip r:embed="rId5">
-            <a:extLst>
-              <a:ext uri="{28A0092B-C50C-407E-A947-70E740481C1C}">
-                <a14:useLocalDpi xmlns:a14="http://schemas.microsoft.com/office/drawing/2010/main" val="0"/>
-              </a:ext>
-            </a:extLst>
-          </a:blip>
-          <a:stretch>
-            <a:fillRect/>
-          </a:stretch>
-        </p:blipFill>
-        <p:spPr>
-          <a:xfrm>
-            <a:off x="6340350" y="1736304"/>
-            <a:ext cx="2635229" cy="2520000"/>
-          </a:xfrm>
-          <a:prstGeom prst="rect">
-            <a:avLst/>
-          </a:prstGeom>
-        </p:spPr>
-      </p:pic>
-      <p:pic>
-        <p:nvPicPr>
-          <p:cNvPr id="31" name="Picture 30" descr="Chart, treemap chart&#10;&#10;Description automatically generated">
-            <a:extLst>
-              <a:ext uri="{FF2B5EF4-FFF2-40B4-BE49-F238E27FC236}">
-                <a16:creationId xmlns:a16="http://schemas.microsoft.com/office/drawing/2014/main" id="{5F00108C-72A6-46A0-AD62-475B01950D59}"/>
-              </a:ext>
-            </a:extLst>
-          </p:cNvPr>
-          <p:cNvPicPr>
-            <a:picLocks noChangeAspect="1"/>
-          </p:cNvPicPr>
-          <p:nvPr/>
-        </p:nvPicPr>
-        <p:blipFill>
-          <a:blip r:embed="rId6">
-            <a:extLst>
-              <a:ext uri="{28A0092B-C50C-407E-A947-70E740481C1C}">
-                <a14:useLocalDpi xmlns:a14="http://schemas.microsoft.com/office/drawing/2010/main" val="0"/>
-              </a:ext>
-            </a:extLst>
-          </a:blip>
-          <a:stretch>
-            <a:fillRect/>
-          </a:stretch>
-        </p:blipFill>
-        <p:spPr>
-          <a:xfrm>
-            <a:off x="6340349" y="4151218"/>
-            <a:ext cx="2635229" cy="2520000"/>
+            <a:off x="721191" y="882650"/>
+            <a:ext cx="12508366" cy="4642397"/>
           </a:xfrm>
           <a:prstGeom prst="rect">
             <a:avLst/>
@@ -6291,7 +6259,7 @@
     </p:spTree>
     <p:extLst>
       <p:ext uri="{BB962C8B-B14F-4D97-AF65-F5344CB8AC3E}">
-        <p14:creationId xmlns:p14="http://schemas.microsoft.com/office/powerpoint/2010/main" val="2143207813"/>
+        <p14:creationId xmlns:p14="http://schemas.microsoft.com/office/powerpoint/2010/main" val="3020113664"/>
       </p:ext>
     </p:extLst>
   </p:cSld>
@@ -6346,7 +6314,7 @@
           <a:p>
             <a:r>
               <a:rPr lang="en-GB" dirty="0"/>
-              <a:t>Performance comparison (Random forest)</a:t>
+              <a:t>Performance comparison (Logistic Regression)</a:t>
             </a:r>
           </a:p>
         </p:txBody>
@@ -6528,7 +6496,7 @@
     </p:spTree>
     <p:extLst>
       <p:ext uri="{BB962C8B-B14F-4D97-AF65-F5344CB8AC3E}">
-        <p14:creationId xmlns:p14="http://schemas.microsoft.com/office/powerpoint/2010/main" val="2501847746"/>
+        <p14:creationId xmlns:p14="http://schemas.microsoft.com/office/powerpoint/2010/main" val="2143207813"/>
       </p:ext>
     </p:extLst>
   </p:cSld>
@@ -6583,28 +6551,267 @@
           </a:p>
         </p:txBody>
       </p:sp>
-      <p:sp>
-        <p:nvSpPr>
-          <p:cNvPr id="3" name="Content Placeholder 2">
+      <p:pic>
+        <p:nvPicPr>
+          <p:cNvPr id="5" name="Picture 4">
             <a:extLst>
               <a:ext uri="{FF2B5EF4-FFF2-40B4-BE49-F238E27FC236}">
-                <a16:creationId xmlns:a16="http://schemas.microsoft.com/office/drawing/2014/main" id="{5D4A82EE-1500-4847-9402-018FB2C2AC78}"/>
+                <a16:creationId xmlns:a16="http://schemas.microsoft.com/office/drawing/2014/main" id="{1B035DA2-E9E0-4F99-86BF-BFF530AC1228}"/>
               </a:ext>
             </a:extLst>
           </p:cNvPr>
-          <p:cNvSpPr>
-            <a:spLocks noGrp="1"/>
-          </p:cNvSpPr>
-          <p:nvPr>
-            <p:ph idx="1"/>
-          </p:nvPr>
-        </p:nvSpPr>
-        <p:spPr/>
-        <p:txBody>
-          <a:bodyPr/>
+          <p:cNvPicPr>
+            <a:picLocks noChangeAspect="1"/>
+          </p:cNvPicPr>
+          <p:nvPr/>
+        </p:nvPicPr>
+        <p:blipFill>
+          <a:blip r:embed="rId2"/>
+          <a:stretch>
+            <a:fillRect/>
+          </a:stretch>
+        </p:blipFill>
+        <p:spPr>
+          <a:xfrm>
+            <a:off x="386362" y="2852754"/>
+            <a:ext cx="2802789" cy="2719687"/>
+          </a:xfrm>
+          <a:prstGeom prst="rect">
+            <a:avLst/>
+          </a:prstGeom>
+        </p:spPr>
+      </p:pic>
+      <p:sp>
+        <p:nvSpPr>
+          <p:cNvPr id="6" name="TextBox 5">
+            <a:extLst>
+              <a:ext uri="{FF2B5EF4-FFF2-40B4-BE49-F238E27FC236}">
+                <a16:creationId xmlns:a16="http://schemas.microsoft.com/office/drawing/2014/main" id="{F66BC9D0-8204-482F-A6AE-A9FCC5435173}"/>
+              </a:ext>
+            </a:extLst>
+          </p:cNvPr>
+          <p:cNvSpPr txBox="1"/>
+          <p:nvPr/>
+        </p:nvSpPr>
+        <p:spPr>
+          <a:xfrm>
+            <a:off x="724989" y="2357846"/>
+            <a:ext cx="2383971" cy="369332"/>
+          </a:xfrm>
+          <a:prstGeom prst="rect">
+            <a:avLst/>
+          </a:prstGeom>
+          <a:noFill/>
+        </p:spPr>
+        <p:txBody>
+          <a:bodyPr wrap="square" rtlCol="0">
+            <a:spAutoFit/>
+          </a:bodyPr>
           <a:lstStyle/>
           <a:p>
-            <a:endParaRPr lang="en-GB"/>
+            <a:r>
+              <a:rPr lang="en-GB" dirty="0"/>
+              <a:t>Mean imputed</a:t>
+            </a:r>
+          </a:p>
+        </p:txBody>
+      </p:sp>
+      <p:pic>
+        <p:nvPicPr>
+          <p:cNvPr id="8" name="Picture 7">
+            <a:extLst>
+              <a:ext uri="{FF2B5EF4-FFF2-40B4-BE49-F238E27FC236}">
+                <a16:creationId xmlns:a16="http://schemas.microsoft.com/office/drawing/2014/main" id="{2DC0B4F7-660A-4786-A1F9-7A8AD0990A84}"/>
+              </a:ext>
+            </a:extLst>
+          </p:cNvPr>
+          <p:cNvPicPr>
+            <a:picLocks noChangeAspect="1"/>
+          </p:cNvPicPr>
+          <p:nvPr/>
+        </p:nvPicPr>
+        <p:blipFill>
+          <a:blip r:embed="rId3"/>
+          <a:stretch>
+            <a:fillRect/>
+          </a:stretch>
+        </p:blipFill>
+        <p:spPr>
+          <a:xfrm>
+            <a:off x="3430216" y="2852754"/>
+            <a:ext cx="2556457" cy="2453096"/>
+          </a:xfrm>
+          <a:prstGeom prst="rect">
+            <a:avLst/>
+          </a:prstGeom>
+        </p:spPr>
+      </p:pic>
+      <p:pic>
+        <p:nvPicPr>
+          <p:cNvPr id="10" name="Picture 9">
+            <a:extLst>
+              <a:ext uri="{FF2B5EF4-FFF2-40B4-BE49-F238E27FC236}">
+                <a16:creationId xmlns:a16="http://schemas.microsoft.com/office/drawing/2014/main" id="{A17ACADC-BE7B-470E-9652-A3041ED04316}"/>
+              </a:ext>
+            </a:extLst>
+          </p:cNvPr>
+          <p:cNvPicPr>
+            <a:picLocks noChangeAspect="1"/>
+          </p:cNvPicPr>
+          <p:nvPr/>
+        </p:nvPicPr>
+        <p:blipFill>
+          <a:blip r:embed="rId4"/>
+          <a:stretch>
+            <a:fillRect/>
+          </a:stretch>
+        </p:blipFill>
+        <p:spPr>
+          <a:xfrm>
+            <a:off x="6205328" y="2852754"/>
+            <a:ext cx="2549566" cy="2453096"/>
+          </a:xfrm>
+          <a:prstGeom prst="rect">
+            <a:avLst/>
+          </a:prstGeom>
+        </p:spPr>
+      </p:pic>
+      <p:pic>
+        <p:nvPicPr>
+          <p:cNvPr id="12" name="Picture 11">
+            <a:extLst>
+              <a:ext uri="{FF2B5EF4-FFF2-40B4-BE49-F238E27FC236}">
+                <a16:creationId xmlns:a16="http://schemas.microsoft.com/office/drawing/2014/main" id="{7F464FE0-5E10-4476-9D17-35CF4D66D257}"/>
+              </a:ext>
+            </a:extLst>
+          </p:cNvPr>
+          <p:cNvPicPr>
+            <a:picLocks noChangeAspect="1"/>
+          </p:cNvPicPr>
+          <p:nvPr/>
+        </p:nvPicPr>
+        <p:blipFill>
+          <a:blip r:embed="rId5"/>
+          <a:stretch>
+            <a:fillRect/>
+          </a:stretch>
+        </p:blipFill>
+        <p:spPr>
+          <a:xfrm>
+            <a:off x="8984754" y="2852754"/>
+            <a:ext cx="2438188" cy="2371752"/>
+          </a:xfrm>
+          <a:prstGeom prst="rect">
+            <a:avLst/>
+          </a:prstGeom>
+        </p:spPr>
+      </p:pic>
+      <p:sp>
+        <p:nvSpPr>
+          <p:cNvPr id="13" name="TextBox 12">
+            <a:extLst>
+              <a:ext uri="{FF2B5EF4-FFF2-40B4-BE49-F238E27FC236}">
+                <a16:creationId xmlns:a16="http://schemas.microsoft.com/office/drawing/2014/main" id="{87C2DFF7-B986-4C19-851F-99BAE8685C6D}"/>
+              </a:ext>
+            </a:extLst>
+          </p:cNvPr>
+          <p:cNvSpPr txBox="1"/>
+          <p:nvPr/>
+        </p:nvSpPr>
+        <p:spPr>
+          <a:xfrm>
+            <a:off x="3591497" y="2357846"/>
+            <a:ext cx="2383971" cy="369332"/>
+          </a:xfrm>
+          <a:prstGeom prst="rect">
+            <a:avLst/>
+          </a:prstGeom>
+          <a:noFill/>
+        </p:spPr>
+        <p:txBody>
+          <a:bodyPr wrap="square" rtlCol="0">
+            <a:spAutoFit/>
+          </a:bodyPr>
+          <a:lstStyle/>
+          <a:p>
+            <a:r>
+              <a:rPr lang="en-GB" dirty="0"/>
+              <a:t>Joint imputed</a:t>
+            </a:r>
+          </a:p>
+        </p:txBody>
+      </p:sp>
+      <p:sp>
+        <p:nvSpPr>
+          <p:cNvPr id="14" name="TextBox 13">
+            <a:extLst>
+              <a:ext uri="{FF2B5EF4-FFF2-40B4-BE49-F238E27FC236}">
+                <a16:creationId xmlns:a16="http://schemas.microsoft.com/office/drawing/2014/main" id="{3F23ABA7-35F1-4172-BC31-B337BF7F8104}"/>
+              </a:ext>
+            </a:extLst>
+          </p:cNvPr>
+          <p:cNvSpPr txBox="1"/>
+          <p:nvPr/>
+        </p:nvSpPr>
+        <p:spPr>
+          <a:xfrm>
+            <a:off x="6288125" y="2357846"/>
+            <a:ext cx="2383971" cy="369332"/>
+          </a:xfrm>
+          <a:prstGeom prst="rect">
+            <a:avLst/>
+          </a:prstGeom>
+          <a:noFill/>
+        </p:spPr>
+        <p:txBody>
+          <a:bodyPr wrap="square" rtlCol="0">
+            <a:spAutoFit/>
+          </a:bodyPr>
+          <a:lstStyle/>
+          <a:p>
+            <a:r>
+              <a:rPr lang="en-GB" dirty="0" err="1"/>
+              <a:t>Knn</a:t>
+            </a:r>
+            <a:r>
+              <a:rPr lang="en-GB" dirty="0"/>
+              <a:t> imputed</a:t>
+            </a:r>
+          </a:p>
+        </p:txBody>
+      </p:sp>
+      <p:sp>
+        <p:nvSpPr>
+          <p:cNvPr id="15" name="TextBox 14">
+            <a:extLst>
+              <a:ext uri="{FF2B5EF4-FFF2-40B4-BE49-F238E27FC236}">
+                <a16:creationId xmlns:a16="http://schemas.microsoft.com/office/drawing/2014/main" id="{B64141CF-BD9D-44CE-90D8-F85928E1732B}"/>
+              </a:ext>
+            </a:extLst>
+          </p:cNvPr>
+          <p:cNvSpPr txBox="1"/>
+          <p:nvPr/>
+        </p:nvSpPr>
+        <p:spPr>
+          <a:xfrm>
+            <a:off x="9083040" y="2357846"/>
+            <a:ext cx="2383971" cy="369332"/>
+          </a:xfrm>
+          <a:prstGeom prst="rect">
+            <a:avLst/>
+          </a:prstGeom>
+          <a:noFill/>
+        </p:spPr>
+        <p:txBody>
+          <a:bodyPr wrap="square" rtlCol="0">
+            <a:spAutoFit/>
+          </a:bodyPr>
+          <a:lstStyle/>
+          <a:p>
+            <a:r>
+              <a:rPr lang="en-GB" dirty="0"/>
+              <a:t>MICE imputed</a:t>
+            </a:r>
           </a:p>
         </p:txBody>
       </p:sp>
@@ -6687,7 +6894,16 @@
           <a:bodyPr/>
           <a:lstStyle/>
           <a:p>
-            <a:endParaRPr lang="en-GB"/>
+            <a:r>
+              <a:rPr lang="en-GB" dirty="0"/>
+              <a:t>Missing at random </a:t>
+            </a:r>
+          </a:p>
+          <a:p>
+            <a:r>
+              <a:rPr lang="en-GB" dirty="0"/>
+              <a:t>Missing not at random</a:t>
+            </a:r>
           </a:p>
         </p:txBody>
       </p:sp>

</xml_diff>